<commit_message>
Updated the user guide. Still missing some pictures inside.
</commit_message>
<xml_diff>
--- a/docs/diagrams/AddRemarkCommand.pptx
+++ b/docs/diagrams/AddRemarkCommand.pptx
@@ -208,7 +208,7 @@
           <a:p>
             <a:fld id="{F5CC4B3F-88C1-4FFA-B1B6-F41C21DC6924}" type="datetimeFigureOut">
               <a:rPr lang="en-US" smtClean="0"/>
-              <a:t>4/3/2018</a:t>
+              <a:t>4/15/2018</a:t>
             </a:fld>
             <a:endParaRPr lang="en-US"/>
           </a:p>
@@ -654,7 +654,7 @@
           <a:p>
             <a:fld id="{78C97017-6FC3-485B-9764-EAC9E56C1D49}" type="datetimeFigureOut">
               <a:rPr lang="en-US" smtClean="0"/>
-              <a:t>4/3/2018</a:t>
+              <a:t>4/15/2018</a:t>
             </a:fld>
             <a:endParaRPr lang="en-US"/>
           </a:p>
@@ -822,7 +822,7 @@
           <a:p>
             <a:fld id="{78C97017-6FC3-485B-9764-EAC9E56C1D49}" type="datetimeFigureOut">
               <a:rPr lang="en-US" smtClean="0"/>
-              <a:t>4/3/2018</a:t>
+              <a:t>4/15/2018</a:t>
             </a:fld>
             <a:endParaRPr lang="en-US"/>
           </a:p>
@@ -1000,7 +1000,7 @@
           <a:p>
             <a:fld id="{78C97017-6FC3-485B-9764-EAC9E56C1D49}" type="datetimeFigureOut">
               <a:rPr lang="en-US" smtClean="0"/>
-              <a:t>4/3/2018</a:t>
+              <a:t>4/15/2018</a:t>
             </a:fld>
             <a:endParaRPr lang="en-US"/>
           </a:p>
@@ -1168,7 +1168,7 @@
           <a:p>
             <a:fld id="{78C97017-6FC3-485B-9764-EAC9E56C1D49}" type="datetimeFigureOut">
               <a:rPr lang="en-US" smtClean="0"/>
-              <a:t>4/3/2018</a:t>
+              <a:t>4/15/2018</a:t>
             </a:fld>
             <a:endParaRPr lang="en-US"/>
           </a:p>
@@ -1413,7 +1413,7 @@
           <a:p>
             <a:fld id="{78C97017-6FC3-485B-9764-EAC9E56C1D49}" type="datetimeFigureOut">
               <a:rPr lang="en-US" smtClean="0"/>
-              <a:t>4/3/2018</a:t>
+              <a:t>4/15/2018</a:t>
             </a:fld>
             <a:endParaRPr lang="en-US"/>
           </a:p>
@@ -1698,7 +1698,7 @@
           <a:p>
             <a:fld id="{78C97017-6FC3-485B-9764-EAC9E56C1D49}" type="datetimeFigureOut">
               <a:rPr lang="en-US" smtClean="0"/>
-              <a:t>4/3/2018</a:t>
+              <a:t>4/15/2018</a:t>
             </a:fld>
             <a:endParaRPr lang="en-US"/>
           </a:p>
@@ -2117,7 +2117,7 @@
           <a:p>
             <a:fld id="{78C97017-6FC3-485B-9764-EAC9E56C1D49}" type="datetimeFigureOut">
               <a:rPr lang="en-US" smtClean="0"/>
-              <a:t>4/3/2018</a:t>
+              <a:t>4/15/2018</a:t>
             </a:fld>
             <a:endParaRPr lang="en-US"/>
           </a:p>
@@ -2234,7 +2234,7 @@
           <a:p>
             <a:fld id="{78C97017-6FC3-485B-9764-EAC9E56C1D49}" type="datetimeFigureOut">
               <a:rPr lang="en-US" smtClean="0"/>
-              <a:t>4/3/2018</a:t>
+              <a:t>4/15/2018</a:t>
             </a:fld>
             <a:endParaRPr lang="en-US"/>
           </a:p>
@@ -2329,7 +2329,7 @@
           <a:p>
             <a:fld id="{78C97017-6FC3-485B-9764-EAC9E56C1D49}" type="datetimeFigureOut">
               <a:rPr lang="en-US" smtClean="0"/>
-              <a:t>4/3/2018</a:t>
+              <a:t>4/15/2018</a:t>
             </a:fld>
             <a:endParaRPr lang="en-US"/>
           </a:p>
@@ -2604,7 +2604,7 @@
           <a:p>
             <a:fld id="{78C97017-6FC3-485B-9764-EAC9E56C1D49}" type="datetimeFigureOut">
               <a:rPr lang="en-US" smtClean="0"/>
-              <a:t>4/3/2018</a:t>
+              <a:t>4/15/2018</a:t>
             </a:fld>
             <a:endParaRPr lang="en-US"/>
           </a:p>
@@ -2856,7 +2856,7 @@
           <a:p>
             <a:fld id="{78C97017-6FC3-485B-9764-EAC9E56C1D49}" type="datetimeFigureOut">
               <a:rPr lang="en-US" smtClean="0"/>
-              <a:t>4/3/2018</a:t>
+              <a:t>4/15/2018</a:t>
             </a:fld>
             <a:endParaRPr lang="en-US"/>
           </a:p>
@@ -3067,7 +3067,7 @@
           <a:p>
             <a:fld id="{78C97017-6FC3-485B-9764-EAC9E56C1D49}" type="datetimeFigureOut">
               <a:rPr lang="en-US" smtClean="0"/>
-              <a:t>4/3/2018</a:t>
+              <a:t>4/15/2018</a:t>
             </a:fld>
             <a:endParaRPr lang="en-US"/>
           </a:p>
@@ -3450,8 +3450,8 @@
         </p:nvSpPr>
         <p:spPr>
           <a:xfrm>
-            <a:off x="3962400" y="3914775"/>
-            <a:ext cx="1143000" cy="657225"/>
+            <a:off x="3733800" y="3352800"/>
+            <a:ext cx="1600200" cy="657225"/>
           </a:xfrm>
           <a:prstGeom prst="rightArrow">
             <a:avLst/>
@@ -3479,39 +3479,6 @@
           <a:p>
             <a:pPr algn="ctr"/>
             <a:endParaRPr lang="en-US"/>
-          </a:p>
-        </p:txBody>
-      </p:sp>
-      <p:sp>
-        <p:nvSpPr>
-          <p:cNvPr id="7" name="TextBox 6"/>
-          <p:cNvSpPr txBox="1"/>
-          <p:nvPr/>
-        </p:nvSpPr>
-        <p:spPr>
-          <a:xfrm>
-            <a:off x="3329678" y="3429000"/>
-            <a:ext cx="2461522" cy="369332"/>
-          </a:xfrm>
-          <a:prstGeom prst="rect">
-            <a:avLst/>
-          </a:prstGeom>
-          <a:noFill/>
-        </p:spPr>
-        <p:txBody>
-          <a:bodyPr wrap="square" rtlCol="0">
-            <a:spAutoFit/>
-          </a:bodyPr>
-          <a:lstStyle/>
-          <a:p>
-            <a:r>
-              <a:rPr lang="en-US" dirty="0" err="1"/>
-              <a:t>Addremark</a:t>
-            </a:r>
-            <a:r>
-              <a:rPr lang="en-US" dirty="0"/>
-              <a:t> 3 r/Geo Rep</a:t>
-            </a:r>
           </a:p>
         </p:txBody>
       </p:sp>
@@ -3631,6 +3598,141 @@
           </a:prstGeom>
         </p:spPr>
       </p:pic>
+      <p:pic>
+        <p:nvPicPr>
+          <p:cNvPr id="2" name="Picture 1">
+            <a:extLst>
+              <a:ext uri="{FF2B5EF4-FFF2-40B4-BE49-F238E27FC236}">
+                <a16:creationId xmlns:a16="http://schemas.microsoft.com/office/drawing/2014/main" id="{97DD4B7A-A6CC-4225-8B1A-08AC45C6FEFD}"/>
+              </a:ext>
+            </a:extLst>
+          </p:cNvPr>
+          <p:cNvPicPr>
+            <a:picLocks noChangeAspect="1"/>
+          </p:cNvPicPr>
+          <p:nvPr/>
+        </p:nvPicPr>
+        <p:blipFill>
+          <a:blip r:embed="rId4"/>
+          <a:stretch>
+            <a:fillRect/>
+          </a:stretch>
+        </p:blipFill>
+        <p:spPr>
+          <a:xfrm>
+            <a:off x="3352800" y="2656522"/>
+            <a:ext cx="2362200" cy="620078"/>
+          </a:xfrm>
+          <a:prstGeom prst="rect">
+            <a:avLst/>
+          </a:prstGeom>
+        </p:spPr>
+      </p:pic>
+      <p:sp>
+        <p:nvSpPr>
+          <p:cNvPr id="4" name="TextBox 3">
+            <a:extLst>
+              <a:ext uri="{FF2B5EF4-FFF2-40B4-BE49-F238E27FC236}">
+                <a16:creationId xmlns:a16="http://schemas.microsoft.com/office/drawing/2014/main" id="{9131CFEC-3BAC-48AE-8434-4B176F8EDBAC}"/>
+              </a:ext>
+            </a:extLst>
+          </p:cNvPr>
+          <p:cNvSpPr txBox="1"/>
+          <p:nvPr/>
+        </p:nvSpPr>
+        <p:spPr>
+          <a:xfrm>
+            <a:off x="7520170" y="3962400"/>
+            <a:ext cx="920445" cy="646331"/>
+          </a:xfrm>
+          <a:prstGeom prst="rect">
+            <a:avLst/>
+          </a:prstGeom>
+          <a:solidFill>
+            <a:schemeClr val="bg1"/>
+          </a:solidFill>
+          <a:ln w="38100">
+            <a:solidFill>
+              <a:srgbClr val="FF0000"/>
+            </a:solidFill>
+          </a:ln>
+        </p:spPr>
+        <p:txBody>
+          <a:bodyPr wrap="none" rtlCol="0">
+            <a:spAutoFit/>
+          </a:bodyPr>
+          <a:lstStyle/>
+          <a:p>
+            <a:r>
+              <a:rPr lang="en-US" dirty="0">
+                <a:solidFill>
+                  <a:srgbClr val="FF0000"/>
+                </a:solidFill>
+              </a:rPr>
+              <a:t>Remark</a:t>
+            </a:r>
+          </a:p>
+          <a:p>
+            <a:r>
+              <a:rPr lang="en-US" dirty="0">
+                <a:solidFill>
+                  <a:srgbClr val="FF0000"/>
+                </a:solidFill>
+              </a:rPr>
+              <a:t>Added</a:t>
+            </a:r>
+            <a:endParaRPr lang="en-SG" dirty="0">
+              <a:solidFill>
+                <a:srgbClr val="FF0000"/>
+              </a:solidFill>
+            </a:endParaRPr>
+          </a:p>
+        </p:txBody>
+      </p:sp>
+      <p:cxnSp>
+        <p:nvCxnSpPr>
+          <p:cNvPr id="10" name="Straight Arrow Connector 9">
+            <a:extLst>
+              <a:ext uri="{FF2B5EF4-FFF2-40B4-BE49-F238E27FC236}">
+                <a16:creationId xmlns:a16="http://schemas.microsoft.com/office/drawing/2014/main" id="{74B9ECD9-83E0-48ED-B3D1-CCB096AF0491}"/>
+              </a:ext>
+            </a:extLst>
+          </p:cNvPr>
+          <p:cNvCxnSpPr>
+            <a:cxnSpLocks/>
+          </p:cNvCxnSpPr>
+          <p:nvPr/>
+        </p:nvCxnSpPr>
+        <p:spPr>
+          <a:xfrm flipH="1">
+            <a:off x="6709094" y="4343400"/>
+            <a:ext cx="758506" cy="228600"/>
+          </a:xfrm>
+          <a:prstGeom prst="straightConnector1">
+            <a:avLst/>
+          </a:prstGeom>
+          <a:ln w="31750">
+            <a:solidFill>
+              <a:schemeClr val="bg1"/>
+            </a:solidFill>
+            <a:tailEnd type="triangle"/>
+          </a:ln>
+        </p:spPr>
+        <p:style>
+          <a:lnRef idx="1">
+            <a:schemeClr val="accent1"/>
+          </a:lnRef>
+          <a:fillRef idx="0">
+            <a:schemeClr val="accent1"/>
+          </a:fillRef>
+          <a:effectRef idx="0">
+            <a:schemeClr val="accent1"/>
+          </a:effectRef>
+          <a:fontRef idx="minor">
+            <a:schemeClr val="tx1"/>
+          </a:fontRef>
+        </p:style>
+      </p:cxnSp>
     </p:spTree>
     <p:extLst>
       <p:ext uri="{BB962C8B-B14F-4D97-AF65-F5344CB8AC3E}">

</xml_diff>